<commit_message>
adding exercise 2 slides
</commit_message>
<xml_diff>
--- a/outputs/exercise_2_standardise_royalty_statements/workflow_design.pptx
+++ b/outputs/exercise_2_standardise_royalty_statements/workflow_design.pptx
@@ -4,6 +4,9 @@
   <p:sldMasterIdLst>
     <p:sldMasterId id="2147483648" r:id="rId1"/>
   </p:sldMasterIdLst>
+  <p:notesMasterIdLst>
+    <p:notesMasterId r:id="rId3"/>
+  </p:notesMasterIdLst>
   <p:sldIdLst>
     <p:sldId id="256" r:id="rId2"/>
   </p:sldIdLst>
@@ -104,7 +107,362 @@
       </a:defRPr>
     </a:lvl9pPr>
   </p:defaultTextStyle>
+  <p:extLst>
+    <p:ext uri="{EFAFB233-063F-42B5-8137-9DF3F51BA10A}">
+      <p15:sldGuideLst xmlns:p15="http://schemas.microsoft.com/office/powerpoint/2012/main"/>
+    </p:ext>
+  </p:extLst>
 </p:presentation>
+</file>
+
+<file path=ppt/notesMasters/notesMaster1.xml><?xml version="1.0" encoding="utf-8"?>
+<p:notesMaster xmlns:a="http://schemas.openxmlformats.org/drawingml/2006/main" xmlns:r="http://schemas.openxmlformats.org/officeDocument/2006/relationships" xmlns:p="http://schemas.openxmlformats.org/presentationml/2006/main">
+  <p:cSld>
+    <p:bg>
+      <p:bgRef idx="1001">
+        <a:schemeClr val="bg1"/>
+      </p:bgRef>
+    </p:bg>
+    <p:spTree>
+      <p:nvGrpSpPr>
+        <p:cNvPr id="1" name=""/>
+        <p:cNvGrpSpPr/>
+        <p:nvPr/>
+      </p:nvGrpSpPr>
+      <p:grpSpPr>
+        <a:xfrm>
+          <a:off x="0" y="0"/>
+          <a:ext cx="0" cy="0"/>
+          <a:chOff x="0" y="0"/>
+          <a:chExt cx="0" cy="0"/>
+        </a:xfrm>
+      </p:grpSpPr>
+      <p:sp>
+        <p:nvSpPr>
+          <p:cNvPr id="2" name="Header Placeholder 1"/>
+          <p:cNvSpPr>
+            <a:spLocks noGrp="1"/>
+          </p:cNvSpPr>
+          <p:nvPr>
+            <p:ph type="hdr" sz="quarter"/>
+          </p:nvPr>
+        </p:nvSpPr>
+        <p:spPr>
+          <a:xfrm>
+            <a:off x="0" y="0"/>
+            <a:ext cx="2971800" cy="458788"/>
+          </a:xfrm>
+          <a:prstGeom prst="rect">
+            <a:avLst/>
+          </a:prstGeom>
+        </p:spPr>
+        <p:txBody>
+          <a:bodyPr vert="horz" lIns="91440" tIns="45720" rIns="91440" bIns="45720" rtlCol="0"/>
+          <a:lstStyle>
+            <a:lvl1pPr algn="l">
+              <a:defRPr sz="1200"/>
+            </a:lvl1pPr>
+          </a:lstStyle>
+          <a:p>
+            <a:endParaRPr lang="en-GB"/>
+          </a:p>
+        </p:txBody>
+      </p:sp>
+      <p:sp>
+        <p:nvSpPr>
+          <p:cNvPr id="3" name="Date Placeholder 2"/>
+          <p:cNvSpPr>
+            <a:spLocks noGrp="1"/>
+          </p:cNvSpPr>
+          <p:nvPr>
+            <p:ph type="dt" idx="1"/>
+          </p:nvPr>
+        </p:nvSpPr>
+        <p:spPr>
+          <a:xfrm>
+            <a:off x="3884613" y="0"/>
+            <a:ext cx="2971800" cy="458788"/>
+          </a:xfrm>
+          <a:prstGeom prst="rect">
+            <a:avLst/>
+          </a:prstGeom>
+        </p:spPr>
+        <p:txBody>
+          <a:bodyPr vert="horz" lIns="91440" tIns="45720" rIns="91440" bIns="45720" rtlCol="0"/>
+          <a:lstStyle>
+            <a:lvl1pPr algn="r">
+              <a:defRPr sz="1200"/>
+            </a:lvl1pPr>
+          </a:lstStyle>
+          <a:p>
+            <a:fld id="{844218FC-8769-4E81-9A30-E611894F5398}" type="datetimeFigureOut">
+              <a:rPr lang="en-GB" smtClean="0"/>
+              <a:t>01/09/2021</a:t>
+            </a:fld>
+            <a:endParaRPr lang="en-GB"/>
+          </a:p>
+        </p:txBody>
+      </p:sp>
+      <p:sp>
+        <p:nvSpPr>
+          <p:cNvPr id="4" name="Slide Image Placeholder 3"/>
+          <p:cNvSpPr>
+            <a:spLocks noGrp="1" noRot="1" noChangeAspect="1"/>
+          </p:cNvSpPr>
+          <p:nvPr>
+            <p:ph type="sldImg" idx="2"/>
+          </p:nvPr>
+        </p:nvSpPr>
+        <p:spPr>
+          <a:xfrm>
+            <a:off x="685800" y="1143000"/>
+            <a:ext cx="5486400" cy="3086100"/>
+          </a:xfrm>
+          <a:prstGeom prst="rect">
+            <a:avLst/>
+          </a:prstGeom>
+          <a:noFill/>
+          <a:ln w="12700">
+            <a:solidFill>
+              <a:prstClr val="black"/>
+            </a:solidFill>
+          </a:ln>
+        </p:spPr>
+        <p:txBody>
+          <a:bodyPr vert="horz" lIns="91440" tIns="45720" rIns="91440" bIns="45720" rtlCol="0" anchor="ctr"/>
+          <a:lstStyle/>
+          <a:p>
+            <a:endParaRPr lang="en-GB"/>
+          </a:p>
+        </p:txBody>
+      </p:sp>
+      <p:sp>
+        <p:nvSpPr>
+          <p:cNvPr id="5" name="Notes Placeholder 4"/>
+          <p:cNvSpPr>
+            <a:spLocks noGrp="1"/>
+          </p:cNvSpPr>
+          <p:nvPr>
+            <p:ph type="body" sz="quarter" idx="3"/>
+          </p:nvPr>
+        </p:nvSpPr>
+        <p:spPr>
+          <a:xfrm>
+            <a:off x="685800" y="4400550"/>
+            <a:ext cx="5486400" cy="3600450"/>
+          </a:xfrm>
+          <a:prstGeom prst="rect">
+            <a:avLst/>
+          </a:prstGeom>
+        </p:spPr>
+        <p:txBody>
+          <a:bodyPr vert="horz" lIns="91440" tIns="45720" rIns="91440" bIns="45720" rtlCol="0"/>
+          <a:lstStyle/>
+          <a:p>
+            <a:pPr lvl="0"/>
+            <a:r>
+              <a:rPr lang="en-US"/>
+              <a:t>Click to edit Master text styles</a:t>
+            </a:r>
+          </a:p>
+          <a:p>
+            <a:pPr lvl="1"/>
+            <a:r>
+              <a:rPr lang="en-US"/>
+              <a:t>Second level</a:t>
+            </a:r>
+          </a:p>
+          <a:p>
+            <a:pPr lvl="2"/>
+            <a:r>
+              <a:rPr lang="en-US"/>
+              <a:t>Third level</a:t>
+            </a:r>
+          </a:p>
+          <a:p>
+            <a:pPr lvl="3"/>
+            <a:r>
+              <a:rPr lang="en-US"/>
+              <a:t>Fourth level</a:t>
+            </a:r>
+          </a:p>
+          <a:p>
+            <a:pPr lvl="4"/>
+            <a:r>
+              <a:rPr lang="en-US"/>
+              <a:t>Fifth level</a:t>
+            </a:r>
+            <a:endParaRPr lang="en-GB"/>
+          </a:p>
+        </p:txBody>
+      </p:sp>
+      <p:sp>
+        <p:nvSpPr>
+          <p:cNvPr id="6" name="Footer Placeholder 5"/>
+          <p:cNvSpPr>
+            <a:spLocks noGrp="1"/>
+          </p:cNvSpPr>
+          <p:nvPr>
+            <p:ph type="ftr" sz="quarter" idx="4"/>
+          </p:nvPr>
+        </p:nvSpPr>
+        <p:spPr>
+          <a:xfrm>
+            <a:off x="0" y="8685213"/>
+            <a:ext cx="2971800" cy="458787"/>
+          </a:xfrm>
+          <a:prstGeom prst="rect">
+            <a:avLst/>
+          </a:prstGeom>
+        </p:spPr>
+        <p:txBody>
+          <a:bodyPr vert="horz" lIns="91440" tIns="45720" rIns="91440" bIns="45720" rtlCol="0" anchor="b"/>
+          <a:lstStyle>
+            <a:lvl1pPr algn="l">
+              <a:defRPr sz="1200"/>
+            </a:lvl1pPr>
+          </a:lstStyle>
+          <a:p>
+            <a:endParaRPr lang="en-GB"/>
+          </a:p>
+        </p:txBody>
+      </p:sp>
+      <p:sp>
+        <p:nvSpPr>
+          <p:cNvPr id="7" name="Slide Number Placeholder 6"/>
+          <p:cNvSpPr>
+            <a:spLocks noGrp="1"/>
+          </p:cNvSpPr>
+          <p:nvPr>
+            <p:ph type="sldNum" sz="quarter" idx="5"/>
+          </p:nvPr>
+        </p:nvSpPr>
+        <p:spPr>
+          <a:xfrm>
+            <a:off x="3884613" y="8685213"/>
+            <a:ext cx="2971800" cy="458787"/>
+          </a:xfrm>
+          <a:prstGeom prst="rect">
+            <a:avLst/>
+          </a:prstGeom>
+        </p:spPr>
+        <p:txBody>
+          <a:bodyPr vert="horz" lIns="91440" tIns="45720" rIns="91440" bIns="45720" rtlCol="0" anchor="b"/>
+          <a:lstStyle>
+            <a:lvl1pPr algn="r">
+              <a:defRPr sz="1200"/>
+            </a:lvl1pPr>
+          </a:lstStyle>
+          <a:p>
+            <a:fld id="{EB78D73A-328C-4523-87E5-EA07964B2588}" type="slidenum">
+              <a:rPr lang="en-GB" smtClean="0"/>
+              <a:t>‹#›</a:t>
+            </a:fld>
+            <a:endParaRPr lang="en-GB"/>
+          </a:p>
+        </p:txBody>
+      </p:sp>
+    </p:spTree>
+    <p:extLst>
+      <p:ext uri="{BB962C8B-B14F-4D97-AF65-F5344CB8AC3E}">
+        <p14:creationId xmlns:p14="http://schemas.microsoft.com/office/powerpoint/2010/main" val="4065720110"/>
+      </p:ext>
+    </p:extLst>
+  </p:cSld>
+  <p:clrMap bg1="lt1" tx1="dk1" bg2="lt2" tx2="dk2" accent1="accent1" accent2="accent2" accent3="accent3" accent4="accent4" accent5="accent5" accent6="accent6" hlink="hlink" folHlink="folHlink"/>
+  <p:notesStyle>
+    <a:lvl1pPr marL="0" algn="l" defTabSz="914400" rtl="0" eaLnBrk="1" latinLnBrk="0" hangingPunct="1">
+      <a:defRPr sz="1200" kern="1200">
+        <a:solidFill>
+          <a:schemeClr val="tx1"/>
+        </a:solidFill>
+        <a:latin typeface="+mn-lt"/>
+        <a:ea typeface="+mn-ea"/>
+        <a:cs typeface="+mn-cs"/>
+      </a:defRPr>
+    </a:lvl1pPr>
+    <a:lvl2pPr marL="457200" algn="l" defTabSz="914400" rtl="0" eaLnBrk="1" latinLnBrk="0" hangingPunct="1">
+      <a:defRPr sz="1200" kern="1200">
+        <a:solidFill>
+          <a:schemeClr val="tx1"/>
+        </a:solidFill>
+        <a:latin typeface="+mn-lt"/>
+        <a:ea typeface="+mn-ea"/>
+        <a:cs typeface="+mn-cs"/>
+      </a:defRPr>
+    </a:lvl2pPr>
+    <a:lvl3pPr marL="914400" algn="l" defTabSz="914400" rtl="0" eaLnBrk="1" latinLnBrk="0" hangingPunct="1">
+      <a:defRPr sz="1200" kern="1200">
+        <a:solidFill>
+          <a:schemeClr val="tx1"/>
+        </a:solidFill>
+        <a:latin typeface="+mn-lt"/>
+        <a:ea typeface="+mn-ea"/>
+        <a:cs typeface="+mn-cs"/>
+      </a:defRPr>
+    </a:lvl3pPr>
+    <a:lvl4pPr marL="1371600" algn="l" defTabSz="914400" rtl="0" eaLnBrk="1" latinLnBrk="0" hangingPunct="1">
+      <a:defRPr sz="1200" kern="1200">
+        <a:solidFill>
+          <a:schemeClr val="tx1"/>
+        </a:solidFill>
+        <a:latin typeface="+mn-lt"/>
+        <a:ea typeface="+mn-ea"/>
+        <a:cs typeface="+mn-cs"/>
+      </a:defRPr>
+    </a:lvl4pPr>
+    <a:lvl5pPr marL="1828800" algn="l" defTabSz="914400" rtl="0" eaLnBrk="1" latinLnBrk="0" hangingPunct="1">
+      <a:defRPr sz="1200" kern="1200">
+        <a:solidFill>
+          <a:schemeClr val="tx1"/>
+        </a:solidFill>
+        <a:latin typeface="+mn-lt"/>
+        <a:ea typeface="+mn-ea"/>
+        <a:cs typeface="+mn-cs"/>
+      </a:defRPr>
+    </a:lvl5pPr>
+    <a:lvl6pPr marL="2286000" algn="l" defTabSz="914400" rtl="0" eaLnBrk="1" latinLnBrk="0" hangingPunct="1">
+      <a:defRPr sz="1200" kern="1200">
+        <a:solidFill>
+          <a:schemeClr val="tx1"/>
+        </a:solidFill>
+        <a:latin typeface="+mn-lt"/>
+        <a:ea typeface="+mn-ea"/>
+        <a:cs typeface="+mn-cs"/>
+      </a:defRPr>
+    </a:lvl6pPr>
+    <a:lvl7pPr marL="2743200" algn="l" defTabSz="914400" rtl="0" eaLnBrk="1" latinLnBrk="0" hangingPunct="1">
+      <a:defRPr sz="1200" kern="1200">
+        <a:solidFill>
+          <a:schemeClr val="tx1"/>
+        </a:solidFill>
+        <a:latin typeface="+mn-lt"/>
+        <a:ea typeface="+mn-ea"/>
+        <a:cs typeface="+mn-cs"/>
+      </a:defRPr>
+    </a:lvl7pPr>
+    <a:lvl8pPr marL="3200400" algn="l" defTabSz="914400" rtl="0" eaLnBrk="1" latinLnBrk="0" hangingPunct="1">
+      <a:defRPr sz="1200" kern="1200">
+        <a:solidFill>
+          <a:schemeClr val="tx1"/>
+        </a:solidFill>
+        <a:latin typeface="+mn-lt"/>
+        <a:ea typeface="+mn-ea"/>
+        <a:cs typeface="+mn-cs"/>
+      </a:defRPr>
+    </a:lvl8pPr>
+    <a:lvl9pPr marL="3657600" algn="l" defTabSz="914400" rtl="0" eaLnBrk="1" latinLnBrk="0" hangingPunct="1">
+      <a:defRPr sz="1200" kern="1200">
+        <a:solidFill>
+          <a:schemeClr val="tx1"/>
+        </a:solidFill>
+        <a:latin typeface="+mn-lt"/>
+        <a:ea typeface="+mn-ea"/>
+        <a:cs typeface="+mn-cs"/>
+      </a:defRPr>
+    </a:lvl9pPr>
+  </p:notesStyle>
+</p:notesMaster>
 </file>
 
 <file path=ppt/slideLayouts/slideLayout1.xml><?xml version="1.0" encoding="utf-8"?>
@@ -254,9 +612,9 @@
           <a:bodyPr/>
           <a:lstStyle/>
           <a:p>
-            <a:fld id="{1ECB4F3D-FFF1-41FF-9DE2-366AB9512230}" type="datetimeFigureOut">
+            <a:fld id="{3A1563AB-6279-4AD8-B692-91E4C7359757}" type="datetime1">
               <a:rPr lang="en-GB" smtClean="0"/>
-              <a:t>29/08/2021</a:t>
+              <a:t>01/09/2021</a:t>
             </a:fld>
             <a:endParaRPr lang="en-GB"/>
           </a:p>
@@ -283,7 +641,10 @@
           <a:bodyPr/>
           <a:lstStyle/>
           <a:p>
-            <a:endParaRPr lang="en-GB"/>
+            <a:r>
+              <a:rPr lang="en-GB"/>
+              <a:t>Jack Ballinger</a:t>
+            </a:r>
           </a:p>
         </p:txBody>
       </p:sp>
@@ -454,9 +815,9 @@
           <a:bodyPr/>
           <a:lstStyle/>
           <a:p>
-            <a:fld id="{1ECB4F3D-FFF1-41FF-9DE2-366AB9512230}" type="datetimeFigureOut">
+            <a:fld id="{5480363E-56D8-45E3-8E4A-E11A810ACBCB}" type="datetime1">
               <a:rPr lang="en-GB" smtClean="0"/>
-              <a:t>29/08/2021</a:t>
+              <a:t>01/09/2021</a:t>
             </a:fld>
             <a:endParaRPr lang="en-GB"/>
           </a:p>
@@ -483,7 +844,10 @@
           <a:bodyPr/>
           <a:lstStyle/>
           <a:p>
-            <a:endParaRPr lang="en-GB"/>
+            <a:r>
+              <a:rPr lang="en-GB"/>
+              <a:t>Jack Ballinger</a:t>
+            </a:r>
           </a:p>
         </p:txBody>
       </p:sp>
@@ -664,9 +1028,9 @@
           <a:bodyPr/>
           <a:lstStyle/>
           <a:p>
-            <a:fld id="{1ECB4F3D-FFF1-41FF-9DE2-366AB9512230}" type="datetimeFigureOut">
+            <a:fld id="{28DF4DB2-C192-4DBA-9872-095616DF2742}" type="datetime1">
               <a:rPr lang="en-GB" smtClean="0"/>
-              <a:t>29/08/2021</a:t>
+              <a:t>01/09/2021</a:t>
             </a:fld>
             <a:endParaRPr lang="en-GB"/>
           </a:p>
@@ -693,7 +1057,10 @@
           <a:bodyPr/>
           <a:lstStyle/>
           <a:p>
-            <a:endParaRPr lang="en-GB"/>
+            <a:r>
+              <a:rPr lang="en-GB"/>
+              <a:t>Jack Ballinger</a:t>
+            </a:r>
           </a:p>
         </p:txBody>
       </p:sp>
@@ -864,9 +1231,9 @@
           <a:bodyPr/>
           <a:lstStyle/>
           <a:p>
-            <a:fld id="{1ECB4F3D-FFF1-41FF-9DE2-366AB9512230}" type="datetimeFigureOut">
+            <a:fld id="{FB79D5C8-12FA-4E37-8D13-3737331ED189}" type="datetime1">
               <a:rPr lang="en-GB" smtClean="0"/>
-              <a:t>29/08/2021</a:t>
+              <a:t>01/09/2021</a:t>
             </a:fld>
             <a:endParaRPr lang="en-GB"/>
           </a:p>
@@ -893,7 +1260,10 @@
           <a:bodyPr/>
           <a:lstStyle/>
           <a:p>
-            <a:endParaRPr lang="en-GB"/>
+            <a:r>
+              <a:rPr lang="en-GB"/>
+              <a:t>Jack Ballinger</a:t>
+            </a:r>
           </a:p>
         </p:txBody>
       </p:sp>
@@ -1140,9 +1510,9 @@
           <a:bodyPr/>
           <a:lstStyle/>
           <a:p>
-            <a:fld id="{1ECB4F3D-FFF1-41FF-9DE2-366AB9512230}" type="datetimeFigureOut">
+            <a:fld id="{F07F81B7-ECCE-46B9-8D74-1F85DF7456AA}" type="datetime1">
               <a:rPr lang="en-GB" smtClean="0"/>
-              <a:t>29/08/2021</a:t>
+              <a:t>01/09/2021</a:t>
             </a:fld>
             <a:endParaRPr lang="en-GB"/>
           </a:p>
@@ -1169,7 +1539,10 @@
           <a:bodyPr/>
           <a:lstStyle/>
           <a:p>
-            <a:endParaRPr lang="en-GB"/>
+            <a:r>
+              <a:rPr lang="en-GB"/>
+              <a:t>Jack Ballinger</a:t>
+            </a:r>
           </a:p>
         </p:txBody>
       </p:sp>
@@ -1408,9 +1781,9 @@
           <a:bodyPr/>
           <a:lstStyle/>
           <a:p>
-            <a:fld id="{1ECB4F3D-FFF1-41FF-9DE2-366AB9512230}" type="datetimeFigureOut">
+            <a:fld id="{BF313090-C00D-4BE0-8873-092C21880C6A}" type="datetime1">
               <a:rPr lang="en-GB" smtClean="0"/>
-              <a:t>29/08/2021</a:t>
+              <a:t>01/09/2021</a:t>
             </a:fld>
             <a:endParaRPr lang="en-GB"/>
           </a:p>
@@ -1437,7 +1810,10 @@
           <a:bodyPr/>
           <a:lstStyle/>
           <a:p>
-            <a:endParaRPr lang="en-GB"/>
+            <a:r>
+              <a:rPr lang="en-GB"/>
+              <a:t>Jack Ballinger</a:t>
+            </a:r>
           </a:p>
         </p:txBody>
       </p:sp>
@@ -1823,9 +2199,9 @@
           <a:bodyPr/>
           <a:lstStyle/>
           <a:p>
-            <a:fld id="{1ECB4F3D-FFF1-41FF-9DE2-366AB9512230}" type="datetimeFigureOut">
+            <a:fld id="{9CF38303-7C16-449B-925F-8171AEA85AE6}" type="datetime1">
               <a:rPr lang="en-GB" smtClean="0"/>
-              <a:t>29/08/2021</a:t>
+              <a:t>01/09/2021</a:t>
             </a:fld>
             <a:endParaRPr lang="en-GB"/>
           </a:p>
@@ -1852,7 +2228,10 @@
           <a:bodyPr/>
           <a:lstStyle/>
           <a:p>
-            <a:endParaRPr lang="en-GB"/>
+            <a:r>
+              <a:rPr lang="en-GB"/>
+              <a:t>Jack Ballinger</a:t>
+            </a:r>
           </a:p>
         </p:txBody>
       </p:sp>
@@ -1965,9 +2344,9 @@
           <a:bodyPr/>
           <a:lstStyle/>
           <a:p>
-            <a:fld id="{1ECB4F3D-FFF1-41FF-9DE2-366AB9512230}" type="datetimeFigureOut">
+            <a:fld id="{D1985D29-E185-456E-A460-E8EE6F128797}" type="datetime1">
               <a:rPr lang="en-GB" smtClean="0"/>
-              <a:t>29/08/2021</a:t>
+              <a:t>01/09/2021</a:t>
             </a:fld>
             <a:endParaRPr lang="en-GB"/>
           </a:p>
@@ -1994,7 +2373,10 @@
           <a:bodyPr/>
           <a:lstStyle/>
           <a:p>
-            <a:endParaRPr lang="en-GB"/>
+            <a:r>
+              <a:rPr lang="en-GB"/>
+              <a:t>Jack Ballinger</a:t>
+            </a:r>
           </a:p>
         </p:txBody>
       </p:sp>
@@ -2078,9 +2460,9 @@
           <a:bodyPr/>
           <a:lstStyle/>
           <a:p>
-            <a:fld id="{1ECB4F3D-FFF1-41FF-9DE2-366AB9512230}" type="datetimeFigureOut">
+            <a:fld id="{E8161C93-77CB-47CC-8614-168FD8B299FD}" type="datetime1">
               <a:rPr lang="en-GB" smtClean="0"/>
-              <a:t>29/08/2021</a:t>
+              <a:t>01/09/2021</a:t>
             </a:fld>
             <a:endParaRPr lang="en-GB"/>
           </a:p>
@@ -2107,7 +2489,10 @@
           <a:bodyPr/>
           <a:lstStyle/>
           <a:p>
-            <a:endParaRPr lang="en-GB"/>
+            <a:r>
+              <a:rPr lang="en-GB"/>
+              <a:t>Jack Ballinger</a:t>
+            </a:r>
           </a:p>
         </p:txBody>
       </p:sp>
@@ -2391,9 +2776,9 @@
           <a:bodyPr/>
           <a:lstStyle/>
           <a:p>
-            <a:fld id="{1ECB4F3D-FFF1-41FF-9DE2-366AB9512230}" type="datetimeFigureOut">
+            <a:fld id="{9C5F86A4-2A5D-409E-9C8E-88BB04206B39}" type="datetime1">
               <a:rPr lang="en-GB" smtClean="0"/>
-              <a:t>29/08/2021</a:t>
+              <a:t>01/09/2021</a:t>
             </a:fld>
             <a:endParaRPr lang="en-GB"/>
           </a:p>
@@ -2420,7 +2805,10 @@
           <a:bodyPr/>
           <a:lstStyle/>
           <a:p>
-            <a:endParaRPr lang="en-GB"/>
+            <a:r>
+              <a:rPr lang="en-GB"/>
+              <a:t>Jack Ballinger</a:t>
+            </a:r>
           </a:p>
         </p:txBody>
       </p:sp>
@@ -2680,9 +3068,9 @@
           <a:bodyPr/>
           <a:lstStyle/>
           <a:p>
-            <a:fld id="{1ECB4F3D-FFF1-41FF-9DE2-366AB9512230}" type="datetimeFigureOut">
+            <a:fld id="{60EAFF8A-B766-4645-8F55-C4C1FEDBB03E}" type="datetime1">
               <a:rPr lang="en-GB" smtClean="0"/>
-              <a:t>29/08/2021</a:t>
+              <a:t>01/09/2021</a:t>
             </a:fld>
             <a:endParaRPr lang="en-GB"/>
           </a:p>
@@ -2709,7 +3097,10 @@
           <a:bodyPr/>
           <a:lstStyle/>
           <a:p>
-            <a:endParaRPr lang="en-GB"/>
+            <a:r>
+              <a:rPr lang="en-GB"/>
+              <a:t>Jack Ballinger</a:t>
+            </a:r>
           </a:p>
         </p:txBody>
       </p:sp>
@@ -2923,9 +3314,9 @@
             </a:lvl1pPr>
           </a:lstStyle>
           <a:p>
-            <a:fld id="{1ECB4F3D-FFF1-41FF-9DE2-366AB9512230}" type="datetimeFigureOut">
+            <a:fld id="{DEFE4423-7435-469C-BB93-EFF2A15AAB62}" type="datetime1">
               <a:rPr lang="en-GB" smtClean="0"/>
-              <a:t>29/08/2021</a:t>
+              <a:t>01/09/2021</a:t>
             </a:fld>
             <a:endParaRPr lang="en-GB"/>
           </a:p>
@@ -2970,7 +3361,10 @@
             </a:lvl1pPr>
           </a:lstStyle>
           <a:p>
-            <a:endParaRPr lang="en-GB"/>
+            <a:r>
+              <a:rPr lang="en-GB"/>
+              <a:t>Jack Ballinger</a:t>
+            </a:r>
           </a:p>
         </p:txBody>
       </p:sp>
@@ -3042,6 +3436,7 @@
     <p:sldLayoutId id="2147483658" r:id="rId10"/>
     <p:sldLayoutId id="2147483659" r:id="rId11"/>
   </p:sldLayoutIdLst>
+  <p:hf sldNum="0" hdr="0" dt="0"/>
   <p:txStyles>
     <p:titleStyle>
       <a:lvl1pPr algn="l" defTabSz="914400" rtl="0" eaLnBrk="1" latinLnBrk="0" hangingPunct="1">
@@ -3342,6 +3737,337 @@
           <a:chExt cx="0" cy="0"/>
         </a:xfrm>
       </p:grpSpPr>
+      <p:sp>
+        <p:nvSpPr>
+          <p:cNvPr id="7" name="TextBox 6">
+            <a:extLst>
+              <a:ext uri="{FF2B5EF4-FFF2-40B4-BE49-F238E27FC236}">
+                <a16:creationId xmlns:a16="http://schemas.microsoft.com/office/drawing/2014/main" id="{9ED85A67-CF6C-419B-83E0-8A5B9A8A357C}"/>
+              </a:ext>
+            </a:extLst>
+          </p:cNvPr>
+          <p:cNvSpPr txBox="1"/>
+          <p:nvPr/>
+        </p:nvSpPr>
+        <p:spPr>
+          <a:xfrm>
+            <a:off x="498231" y="275493"/>
+            <a:ext cx="3563815" cy="646331"/>
+          </a:xfrm>
+          <a:prstGeom prst="rect">
+            <a:avLst/>
+          </a:prstGeom>
+          <a:noFill/>
+        </p:spPr>
+        <p:txBody>
+          <a:bodyPr wrap="square" rtlCol="0">
+            <a:spAutoFit/>
+          </a:bodyPr>
+          <a:lstStyle/>
+          <a:p>
+            <a:r>
+              <a:rPr lang="en-GB" dirty="0">
+                <a:solidFill>
+                  <a:srgbClr val="2D4057"/>
+                </a:solidFill>
+                <a:latin typeface="Corbel" panose="020B0503020204020204" pitchFamily="34" charset="0"/>
+              </a:rPr>
+              <a:t>Music Royalties CSV Workflow Design</a:t>
+            </a:r>
+          </a:p>
+        </p:txBody>
+      </p:sp>
+      <p:cxnSp>
+        <p:nvCxnSpPr>
+          <p:cNvPr id="9" name="Straight Connector 8">
+            <a:extLst>
+              <a:ext uri="{FF2B5EF4-FFF2-40B4-BE49-F238E27FC236}">
+                <a16:creationId xmlns:a16="http://schemas.microsoft.com/office/drawing/2014/main" id="{BB093D12-3C4D-4524-89EF-5B094040565F}"/>
+              </a:ext>
+            </a:extLst>
+          </p:cNvPr>
+          <p:cNvCxnSpPr>
+            <a:cxnSpLocks/>
+          </p:cNvCxnSpPr>
+          <p:nvPr/>
+        </p:nvCxnSpPr>
+        <p:spPr>
+          <a:xfrm>
+            <a:off x="498231" y="1033193"/>
+            <a:ext cx="11177954" cy="0"/>
+          </a:xfrm>
+          <a:prstGeom prst="line">
+            <a:avLst/>
+          </a:prstGeom>
+          <a:ln>
+            <a:solidFill>
+              <a:srgbClr val="FA9483"/>
+            </a:solidFill>
+          </a:ln>
+        </p:spPr>
+        <p:style>
+          <a:lnRef idx="1">
+            <a:schemeClr val="accent1"/>
+          </a:lnRef>
+          <a:fillRef idx="0">
+            <a:schemeClr val="accent1"/>
+          </a:fillRef>
+          <a:effectRef idx="0">
+            <a:schemeClr val="accent1"/>
+          </a:effectRef>
+          <a:fontRef idx="minor">
+            <a:schemeClr val="tx1"/>
+          </a:fontRef>
+        </p:style>
+      </p:cxnSp>
+      <p:sp>
+        <p:nvSpPr>
+          <p:cNvPr id="11" name="Footer Placeholder 10">
+            <a:extLst>
+              <a:ext uri="{FF2B5EF4-FFF2-40B4-BE49-F238E27FC236}">
+                <a16:creationId xmlns:a16="http://schemas.microsoft.com/office/drawing/2014/main" id="{7BF4D3B2-C9A1-486A-BA88-99DD529604E8}"/>
+              </a:ext>
+            </a:extLst>
+          </p:cNvPr>
+          <p:cNvSpPr>
+            <a:spLocks noGrp="1"/>
+          </p:cNvSpPr>
+          <p:nvPr>
+            <p:ph type="ftr" sz="quarter" idx="11"/>
+          </p:nvPr>
+        </p:nvSpPr>
+        <p:spPr>
+          <a:xfrm>
+            <a:off x="87923" y="6399944"/>
+            <a:ext cx="1494693" cy="365125"/>
+          </a:xfrm>
+        </p:spPr>
+        <p:txBody>
+          <a:bodyPr/>
+          <a:lstStyle/>
+          <a:p>
+            <a:r>
+              <a:rPr lang="en-GB" dirty="0">
+                <a:solidFill>
+                  <a:srgbClr val="2D4057"/>
+                </a:solidFill>
+              </a:rPr>
+              <a:t>Jack Ballinger</a:t>
+            </a:r>
+          </a:p>
+        </p:txBody>
+      </p:sp>
+      <p:sp>
+        <p:nvSpPr>
+          <p:cNvPr id="12" name="TextBox 11">
+            <a:extLst>
+              <a:ext uri="{FF2B5EF4-FFF2-40B4-BE49-F238E27FC236}">
+                <a16:creationId xmlns:a16="http://schemas.microsoft.com/office/drawing/2014/main" id="{B3B847B4-C250-452E-81A2-F02AB078BA6D}"/>
+              </a:ext>
+            </a:extLst>
+          </p:cNvPr>
+          <p:cNvSpPr txBox="1"/>
+          <p:nvPr/>
+        </p:nvSpPr>
+        <p:spPr>
+          <a:xfrm>
+            <a:off x="257907" y="1330568"/>
+            <a:ext cx="5996355" cy="4524315"/>
+          </a:xfrm>
+          <a:prstGeom prst="rect">
+            <a:avLst/>
+          </a:prstGeom>
+          <a:noFill/>
+        </p:spPr>
+        <p:txBody>
+          <a:bodyPr wrap="square" rtlCol="0">
+            <a:spAutoFit/>
+          </a:bodyPr>
+          <a:lstStyle/>
+          <a:p>
+            <a:r>
+              <a:rPr lang="en-GB" sz="1600" dirty="0">
+                <a:solidFill>
+                  <a:srgbClr val="2D4057"/>
+                </a:solidFill>
+                <a:latin typeface="Corbel" panose="020B0503020204020204" pitchFamily="34" charset="0"/>
+              </a:rPr>
+              <a:t>I have designed a simple work flow process to extract data from various different formats of csv files.</a:t>
+            </a:r>
+          </a:p>
+          <a:p>
+            <a:endParaRPr lang="en-GB" sz="1600" dirty="0">
+              <a:solidFill>
+                <a:srgbClr val="2D4057"/>
+              </a:solidFill>
+              <a:latin typeface="Corbel" panose="020B0503020204020204" pitchFamily="34" charset="0"/>
+            </a:endParaRPr>
+          </a:p>
+          <a:p>
+            <a:r>
+              <a:rPr lang="en-GB" sz="1600" dirty="0">
+                <a:solidFill>
+                  <a:srgbClr val="2D4057"/>
+                </a:solidFill>
+                <a:latin typeface="Corbel" panose="020B0503020204020204" pitchFamily="34" charset="0"/>
+              </a:rPr>
+              <a:t>The assumption behind the process is that the vast majority of music royalty statements will follow very similar patterns, as, after all, they are attempting to show the same data.</a:t>
+            </a:r>
+          </a:p>
+          <a:p>
+            <a:endParaRPr lang="en-GB" sz="1600" dirty="0">
+              <a:solidFill>
+                <a:srgbClr val="2D4057"/>
+              </a:solidFill>
+              <a:latin typeface="Corbel" panose="020B0503020204020204" pitchFamily="34" charset="0"/>
+            </a:endParaRPr>
+          </a:p>
+          <a:p>
+            <a:r>
+              <a:rPr lang="en-GB" sz="1600" dirty="0">
+                <a:solidFill>
+                  <a:srgbClr val="2D4057"/>
+                </a:solidFill>
+                <a:latin typeface="Corbel" panose="020B0503020204020204" pitchFamily="34" charset="0"/>
+              </a:rPr>
+              <a:t>The basis behind the process is to build up a library of schema types and their corresponding sources.</a:t>
+            </a:r>
+          </a:p>
+          <a:p>
+            <a:endParaRPr lang="en-GB" sz="1600" dirty="0">
+              <a:solidFill>
+                <a:srgbClr val="2D4057"/>
+              </a:solidFill>
+              <a:latin typeface="Corbel" panose="020B0503020204020204" pitchFamily="34" charset="0"/>
+            </a:endParaRPr>
+          </a:p>
+          <a:p>
+            <a:r>
+              <a:rPr lang="en-GB" sz="1600" dirty="0">
+                <a:solidFill>
+                  <a:srgbClr val="2D4057"/>
+                </a:solidFill>
+                <a:latin typeface="Corbel" panose="020B0503020204020204" pitchFamily="34" charset="0"/>
+              </a:rPr>
+              <a:t>When a new schema type is encountered, functions will be used to determine the required columns.</a:t>
+            </a:r>
+          </a:p>
+          <a:p>
+            <a:endParaRPr lang="en-GB" sz="1600" dirty="0">
+              <a:solidFill>
+                <a:srgbClr val="2D4057"/>
+              </a:solidFill>
+              <a:latin typeface="Corbel" panose="020B0503020204020204" pitchFamily="34" charset="0"/>
+            </a:endParaRPr>
+          </a:p>
+          <a:p>
+            <a:r>
+              <a:rPr lang="en-GB" sz="1600" dirty="0">
+                <a:solidFill>
+                  <a:srgbClr val="2D4057"/>
+                </a:solidFill>
+                <a:latin typeface="Corbel" panose="020B0503020204020204" pitchFamily="34" charset="0"/>
+              </a:rPr>
+              <a:t>For example, I envisage that every royalty statement will have a royalty payment column and a date column. Either the column headings or the information in the columns will follow specific patterns, which can be recognised, ensuring the correct data is parsed.</a:t>
+            </a:r>
+          </a:p>
+        </p:txBody>
+      </p:sp>
+      <p:grpSp>
+        <p:nvGrpSpPr>
+          <p:cNvPr id="14" name="Group 13">
+            <a:extLst>
+              <a:ext uri="{FF2B5EF4-FFF2-40B4-BE49-F238E27FC236}">
+                <a16:creationId xmlns:a16="http://schemas.microsoft.com/office/drawing/2014/main" id="{0390E17B-6AAB-49EE-8BD2-9CE7DA7A6C5B}"/>
+              </a:ext>
+            </a:extLst>
+          </p:cNvPr>
+          <p:cNvGrpSpPr/>
+          <p:nvPr/>
+        </p:nvGrpSpPr>
+        <p:grpSpPr>
+          <a:xfrm>
+            <a:off x="5796717" y="1885803"/>
+            <a:ext cx="6324945" cy="4426211"/>
+            <a:chOff x="5796717" y="1885803"/>
+            <a:chExt cx="6324945" cy="4426211"/>
+          </a:xfrm>
+        </p:grpSpPr>
+        <p:pic>
+          <p:nvPicPr>
+            <p:cNvPr id="6" name="Picture 5">
+              <a:extLst>
+                <a:ext uri="{FF2B5EF4-FFF2-40B4-BE49-F238E27FC236}">
+                  <a16:creationId xmlns:a16="http://schemas.microsoft.com/office/drawing/2014/main" id="{940D7433-15DD-4F6F-B23C-2CF6F23FFDED}"/>
+                </a:ext>
+              </a:extLst>
+            </p:cNvPr>
+            <p:cNvPicPr>
+              <a:picLocks noChangeAspect="1"/>
+            </p:cNvPicPr>
+            <p:nvPr/>
+          </p:nvPicPr>
+          <p:blipFill rotWithShape="1">
+            <a:blip r:embed="rId2">
+              <a:extLst>
+                <a:ext uri="{28A0092B-C50C-407E-A947-70E740481C1C}">
+                  <a14:useLocalDpi xmlns:a14="http://schemas.microsoft.com/office/drawing/2010/main" val="0"/>
+                </a:ext>
+              </a:extLst>
+            </a:blip>
+            <a:srcRect t="10428" b="5948"/>
+            <a:stretch/>
+          </p:blipFill>
+          <p:spPr>
+            <a:xfrm>
+              <a:off x="5796717" y="1885803"/>
+              <a:ext cx="6324945" cy="4087106"/>
+            </a:xfrm>
+            <a:prstGeom prst="rect">
+              <a:avLst/>
+            </a:prstGeom>
+          </p:spPr>
+        </p:pic>
+        <p:sp>
+          <p:nvSpPr>
+            <p:cNvPr id="13" name="TextBox 12">
+              <a:extLst>
+                <a:ext uri="{FF2B5EF4-FFF2-40B4-BE49-F238E27FC236}">
+                  <a16:creationId xmlns:a16="http://schemas.microsoft.com/office/drawing/2014/main" id="{2098ACAF-2FEF-4956-A5FA-016934AAD8C1}"/>
+                </a:ext>
+              </a:extLst>
+            </p:cNvPr>
+            <p:cNvSpPr txBox="1"/>
+            <p:nvPr/>
+          </p:nvSpPr>
+          <p:spPr>
+            <a:xfrm>
+              <a:off x="7702057" y="6058098"/>
+              <a:ext cx="2520461" cy="253916"/>
+            </a:xfrm>
+            <a:prstGeom prst="rect">
+              <a:avLst/>
+            </a:prstGeom>
+            <a:noFill/>
+          </p:spPr>
+          <p:txBody>
+            <a:bodyPr wrap="square" rtlCol="0">
+              <a:spAutoFit/>
+            </a:bodyPr>
+            <a:lstStyle/>
+            <a:p>
+              <a:r>
+                <a:rPr lang="en-GB" sz="1050" dirty="0">
+                  <a:solidFill>
+                    <a:srgbClr val="2D4057"/>
+                  </a:solidFill>
+                </a:rPr>
+                <a:t>Generic music royalty statement csv parser</a:t>
+              </a:r>
+            </a:p>
+          </p:txBody>
+        </p:sp>
+      </p:grpSp>
     </p:spTree>
     <p:extLst>
       <p:ext uri="{BB962C8B-B14F-4D97-AF65-F5344CB8AC3E}">
@@ -3648,4 +4374,299 @@
     </a:ext>
   </a:extLst>
 </a:theme>
+</file>
+
+<file path=ppt/theme/theme2.xml><?xml version="1.0" encoding="utf-8"?>
+<a:theme xmlns:a="http://schemas.openxmlformats.org/drawingml/2006/main" name="Office Theme">
+  <a:themeElements>
+    <a:clrScheme name="Office">
+      <a:dk1>
+        <a:sysClr val="windowText" lastClr="000000"/>
+      </a:dk1>
+      <a:lt1>
+        <a:sysClr val="window" lastClr="FFFFFF"/>
+      </a:lt1>
+      <a:dk2>
+        <a:srgbClr val="44546A"/>
+      </a:dk2>
+      <a:lt2>
+        <a:srgbClr val="E7E6E6"/>
+      </a:lt2>
+      <a:accent1>
+        <a:srgbClr val="4472C4"/>
+      </a:accent1>
+      <a:accent2>
+        <a:srgbClr val="ED7D31"/>
+      </a:accent2>
+      <a:accent3>
+        <a:srgbClr val="A5A5A5"/>
+      </a:accent3>
+      <a:accent4>
+        <a:srgbClr val="FFC000"/>
+      </a:accent4>
+      <a:accent5>
+        <a:srgbClr val="5B9BD5"/>
+      </a:accent5>
+      <a:accent6>
+        <a:srgbClr val="70AD47"/>
+      </a:accent6>
+      <a:hlink>
+        <a:srgbClr val="0563C1"/>
+      </a:hlink>
+      <a:folHlink>
+        <a:srgbClr val="954F72"/>
+      </a:folHlink>
+    </a:clrScheme>
+    <a:fontScheme name="Office">
+      <a:majorFont>
+        <a:latin typeface="Calibri Light" panose="020F0302020204030204"/>
+        <a:ea typeface=""/>
+        <a:cs typeface=""/>
+        <a:font script="Jpan" typeface="游ゴシック Light"/>
+        <a:font script="Hang" typeface="맑은 고딕"/>
+        <a:font script="Hans" typeface="等线 Light"/>
+        <a:font script="Hant" typeface="新細明體"/>
+        <a:font script="Arab" typeface="Times New Roman"/>
+        <a:font script="Hebr" typeface="Times New Roman"/>
+        <a:font script="Thai" typeface="Angsana New"/>
+        <a:font script="Ethi" typeface="Nyala"/>
+        <a:font script="Beng" typeface="Vrinda"/>
+        <a:font script="Gujr" typeface="Shruti"/>
+        <a:font script="Khmr" typeface="MoolBoran"/>
+        <a:font script="Knda" typeface="Tunga"/>
+        <a:font script="Guru" typeface="Raavi"/>
+        <a:font script="Cans" typeface="Euphemia"/>
+        <a:font script="Cher" typeface="Plantagenet Cherokee"/>
+        <a:font script="Yiii" typeface="Microsoft Yi Baiti"/>
+        <a:font script="Tibt" typeface="Microsoft Himalaya"/>
+        <a:font script="Thaa" typeface="MV Boli"/>
+        <a:font script="Deva" typeface="Mangal"/>
+        <a:font script="Telu" typeface="Gautami"/>
+        <a:font script="Taml" typeface="Latha"/>
+        <a:font script="Syrc" typeface="Estrangelo Edessa"/>
+        <a:font script="Orya" typeface="Kalinga"/>
+        <a:font script="Mlym" typeface="Kartika"/>
+        <a:font script="Laoo" typeface="DokChampa"/>
+        <a:font script="Sinh" typeface="Iskoola Pota"/>
+        <a:font script="Mong" typeface="Mongolian Baiti"/>
+        <a:font script="Viet" typeface="Times New Roman"/>
+        <a:font script="Uigh" typeface="Microsoft Uighur"/>
+        <a:font script="Geor" typeface="Sylfaen"/>
+        <a:font script="Armn" typeface="Arial"/>
+        <a:font script="Bugi" typeface="Leelawadee UI"/>
+        <a:font script="Bopo" typeface="Microsoft JhengHei"/>
+        <a:font script="Java" typeface="Javanese Text"/>
+        <a:font script="Lisu" typeface="Segoe UI"/>
+        <a:font script="Mymr" typeface="Myanmar Text"/>
+        <a:font script="Nkoo" typeface="Ebrima"/>
+        <a:font script="Olck" typeface="Nirmala UI"/>
+        <a:font script="Osma" typeface="Ebrima"/>
+        <a:font script="Phag" typeface="Phagspa"/>
+        <a:font script="Syrn" typeface="Estrangelo Edessa"/>
+        <a:font script="Syrj" typeface="Estrangelo Edessa"/>
+        <a:font script="Syre" typeface="Estrangelo Edessa"/>
+        <a:font script="Sora" typeface="Nirmala UI"/>
+        <a:font script="Tale" typeface="Microsoft Tai Le"/>
+        <a:font script="Talu" typeface="Microsoft New Tai Lue"/>
+        <a:font script="Tfng" typeface="Ebrima"/>
+      </a:majorFont>
+      <a:minorFont>
+        <a:latin typeface="Calibri" panose="020F0502020204030204"/>
+        <a:ea typeface=""/>
+        <a:cs typeface=""/>
+        <a:font script="Jpan" typeface="游ゴシック"/>
+        <a:font script="Hang" typeface="맑은 고딕"/>
+        <a:font script="Hans" typeface="等线"/>
+        <a:font script="Hant" typeface="新細明體"/>
+        <a:font script="Arab" typeface="Arial"/>
+        <a:font script="Hebr" typeface="Arial"/>
+        <a:font script="Thai" typeface="Cordia New"/>
+        <a:font script="Ethi" typeface="Nyala"/>
+        <a:font script="Beng" typeface="Vrinda"/>
+        <a:font script="Gujr" typeface="Shruti"/>
+        <a:font script="Khmr" typeface="DaunPenh"/>
+        <a:font script="Knda" typeface="Tunga"/>
+        <a:font script="Guru" typeface="Raavi"/>
+        <a:font script="Cans" typeface="Euphemia"/>
+        <a:font script="Cher" typeface="Plantagenet Cherokee"/>
+        <a:font script="Yiii" typeface="Microsoft Yi Baiti"/>
+        <a:font script="Tibt" typeface="Microsoft Himalaya"/>
+        <a:font script="Thaa" typeface="MV Boli"/>
+        <a:font script="Deva" typeface="Mangal"/>
+        <a:font script="Telu" typeface="Gautami"/>
+        <a:font script="Taml" typeface="Latha"/>
+        <a:font script="Syrc" typeface="Estrangelo Edessa"/>
+        <a:font script="Orya" typeface="Kalinga"/>
+        <a:font script="Mlym" typeface="Kartika"/>
+        <a:font script="Laoo" typeface="DokChampa"/>
+        <a:font script="Sinh" typeface="Iskoola Pota"/>
+        <a:font script="Mong" typeface="Mongolian Baiti"/>
+        <a:font script="Viet" typeface="Arial"/>
+        <a:font script="Uigh" typeface="Microsoft Uighur"/>
+        <a:font script="Geor" typeface="Sylfaen"/>
+        <a:font script="Armn" typeface="Arial"/>
+        <a:font script="Bugi" typeface="Leelawadee UI"/>
+        <a:font script="Bopo" typeface="Microsoft JhengHei"/>
+        <a:font script="Java" typeface="Javanese Text"/>
+        <a:font script="Lisu" typeface="Segoe UI"/>
+        <a:font script="Mymr" typeface="Myanmar Text"/>
+        <a:font script="Nkoo" typeface="Ebrima"/>
+        <a:font script="Olck" typeface="Nirmala UI"/>
+        <a:font script="Osma" typeface="Ebrima"/>
+        <a:font script="Phag" typeface="Phagspa"/>
+        <a:font script="Syrn" typeface="Estrangelo Edessa"/>
+        <a:font script="Syrj" typeface="Estrangelo Edessa"/>
+        <a:font script="Syre" typeface="Estrangelo Edessa"/>
+        <a:font script="Sora" typeface="Nirmala UI"/>
+        <a:font script="Tale" typeface="Microsoft Tai Le"/>
+        <a:font script="Talu" typeface="Microsoft New Tai Lue"/>
+        <a:font script="Tfng" typeface="Ebrima"/>
+      </a:minorFont>
+    </a:fontScheme>
+    <a:fmtScheme name="Office">
+      <a:fillStyleLst>
+        <a:solidFill>
+          <a:schemeClr val="phClr"/>
+        </a:solidFill>
+        <a:gradFill rotWithShape="1">
+          <a:gsLst>
+            <a:gs pos="0">
+              <a:schemeClr val="phClr">
+                <a:lumMod val="110000"/>
+                <a:satMod val="105000"/>
+                <a:tint val="67000"/>
+              </a:schemeClr>
+            </a:gs>
+            <a:gs pos="50000">
+              <a:schemeClr val="phClr">
+                <a:lumMod val="105000"/>
+                <a:satMod val="103000"/>
+                <a:tint val="73000"/>
+              </a:schemeClr>
+            </a:gs>
+            <a:gs pos="100000">
+              <a:schemeClr val="phClr">
+                <a:lumMod val="105000"/>
+                <a:satMod val="109000"/>
+                <a:tint val="81000"/>
+              </a:schemeClr>
+            </a:gs>
+          </a:gsLst>
+          <a:lin ang="5400000" scaled="0"/>
+        </a:gradFill>
+        <a:gradFill rotWithShape="1">
+          <a:gsLst>
+            <a:gs pos="0">
+              <a:schemeClr val="phClr">
+                <a:satMod val="103000"/>
+                <a:lumMod val="102000"/>
+                <a:tint val="94000"/>
+              </a:schemeClr>
+            </a:gs>
+            <a:gs pos="50000">
+              <a:schemeClr val="phClr">
+                <a:satMod val="110000"/>
+                <a:lumMod val="100000"/>
+                <a:shade val="100000"/>
+              </a:schemeClr>
+            </a:gs>
+            <a:gs pos="100000">
+              <a:schemeClr val="phClr">
+                <a:lumMod val="99000"/>
+                <a:satMod val="120000"/>
+                <a:shade val="78000"/>
+              </a:schemeClr>
+            </a:gs>
+          </a:gsLst>
+          <a:lin ang="5400000" scaled="0"/>
+        </a:gradFill>
+      </a:fillStyleLst>
+      <a:lnStyleLst>
+        <a:ln w="6350" cap="flat" cmpd="sng" algn="ctr">
+          <a:solidFill>
+            <a:schemeClr val="phClr"/>
+          </a:solidFill>
+          <a:prstDash val="solid"/>
+          <a:miter lim="800000"/>
+        </a:ln>
+        <a:ln w="12700" cap="flat" cmpd="sng" algn="ctr">
+          <a:solidFill>
+            <a:schemeClr val="phClr"/>
+          </a:solidFill>
+          <a:prstDash val="solid"/>
+          <a:miter lim="800000"/>
+        </a:ln>
+        <a:ln w="19050" cap="flat" cmpd="sng" algn="ctr">
+          <a:solidFill>
+            <a:schemeClr val="phClr"/>
+          </a:solidFill>
+          <a:prstDash val="solid"/>
+          <a:miter lim="800000"/>
+        </a:ln>
+      </a:lnStyleLst>
+      <a:effectStyleLst>
+        <a:effectStyle>
+          <a:effectLst/>
+        </a:effectStyle>
+        <a:effectStyle>
+          <a:effectLst/>
+        </a:effectStyle>
+        <a:effectStyle>
+          <a:effectLst>
+            <a:outerShdw blurRad="57150" dist="19050" dir="5400000" algn="ctr" rotWithShape="0">
+              <a:srgbClr val="000000">
+                <a:alpha val="63000"/>
+              </a:srgbClr>
+            </a:outerShdw>
+          </a:effectLst>
+        </a:effectStyle>
+      </a:effectStyleLst>
+      <a:bgFillStyleLst>
+        <a:solidFill>
+          <a:schemeClr val="phClr"/>
+        </a:solidFill>
+        <a:solidFill>
+          <a:schemeClr val="phClr">
+            <a:tint val="95000"/>
+            <a:satMod val="170000"/>
+          </a:schemeClr>
+        </a:solidFill>
+        <a:gradFill rotWithShape="1">
+          <a:gsLst>
+            <a:gs pos="0">
+              <a:schemeClr val="phClr">
+                <a:tint val="93000"/>
+                <a:satMod val="150000"/>
+                <a:shade val="98000"/>
+                <a:lumMod val="102000"/>
+              </a:schemeClr>
+            </a:gs>
+            <a:gs pos="50000">
+              <a:schemeClr val="phClr">
+                <a:tint val="98000"/>
+                <a:satMod val="130000"/>
+                <a:shade val="90000"/>
+                <a:lumMod val="103000"/>
+              </a:schemeClr>
+            </a:gs>
+            <a:gs pos="100000">
+              <a:schemeClr val="phClr">
+                <a:shade val="63000"/>
+                <a:satMod val="120000"/>
+              </a:schemeClr>
+            </a:gs>
+          </a:gsLst>
+          <a:lin ang="5400000" scaled="0"/>
+        </a:gradFill>
+      </a:bgFillStyleLst>
+    </a:fmtScheme>
+  </a:themeElements>
+  <a:objectDefaults/>
+  <a:extraClrSchemeLst/>
+  <a:extLst>
+    <a:ext uri="{05A4C25C-085E-4340-85A3-A5531E510DB2}">
+      <thm15:themeFamily xmlns:thm15="http://schemas.microsoft.com/office/thememl/2012/main" name="Office Theme" id="{62F939B6-93AF-4DB8-9C6B-D6C7DFDC589F}" vid="{4A3C46E8-61CC-4603-A589-7422A47A8E4A}"/>
+    </a:ext>
+  </a:extLst>
+</a:theme>
 </file>
</xml_diff>